<commit_message>
Aula de dia 15 de Dezembro Coloquei a capa e adicionei as fotos
</commit_message>
<xml_diff>
--- a/CAPA SITE.pptx
+++ b/CAPA SITE.pptx
@@ -6,6 +6,7 @@
   </p:sldMasterIdLst>
   <p:sldIdLst>
     <p:sldId id="256" r:id="rId2"/>
+    <p:sldId id="257" r:id="rId3"/>
   </p:sldIdLst>
   <p:sldSz cx="12192000" cy="6858000"/>
   <p:notesSz cx="6858000" cy="9144000"/>
@@ -104,7 +105,88 @@
       </a:defRPr>
     </a:lvl9pPr>
   </p:defaultTextStyle>
+  <p:extLst>
+    <p:ext uri="{EFAFB233-063F-42B5-8137-9DF3F51BA10A}">
+      <p15:sldGuideLst xmlns:p15="http://schemas.microsoft.com/office/powerpoint/2012/main"/>
+    </p:ext>
+  </p:extLst>
 </p:presentation>
+</file>
+
+<file path=ppt/revisionInfo.xml><?xml version="1.0" encoding="utf-8"?>
+<p1510:revInfo xmlns:a="http://schemas.openxmlformats.org/drawingml/2006/main" xmlns:r="http://schemas.openxmlformats.org/officeDocument/2006/relationships" xmlns:p1510="http://schemas.microsoft.com/office/powerpoint/2015/10/main">
+  <p1510:revLst>
+    <p1510:client id="{C0A99F11-A946-4DBD-A5D5-23B2D77DE6CB}" v="22" dt="2020-12-15T12:18:29.098"/>
+  </p1510:revLst>
+</p1510:revInfo>
+</file>
+
+<file path=ppt/changesInfos/changesInfo1.xml><?xml version="1.0" encoding="utf-8"?>
+<pc:chgInfo xmlns:a="http://schemas.openxmlformats.org/drawingml/2006/main" xmlns:r="http://schemas.openxmlformats.org/officeDocument/2006/relationships" xmlns:ac="http://schemas.microsoft.com/office/drawing/2013/main/command" xmlns:pc="http://schemas.microsoft.com/office/powerpoint/2013/main/command">
+  <pc:docChgLst>
+    <pc:chgData name="Maria Inês Castelo" userId="2a22a08b33d9f8fc" providerId="LiveId" clId="{C0A99F11-A946-4DBD-A5D5-23B2D77DE6CB}"/>
+    <pc:docChg chg="undo custSel addSld modSld">
+      <pc:chgData name="Maria Inês Castelo" userId="2a22a08b33d9f8fc" providerId="LiveId" clId="{C0A99F11-A946-4DBD-A5D5-23B2D77DE6CB}" dt="2020-12-15T12:19:48.625" v="61" actId="1076"/>
+      <pc:docMkLst>
+        <pc:docMk/>
+      </pc:docMkLst>
+      <pc:sldChg chg="addSp delSp modSp">
+        <pc:chgData name="Maria Inês Castelo" userId="2a22a08b33d9f8fc" providerId="LiveId" clId="{C0A99F11-A946-4DBD-A5D5-23B2D77DE6CB}" dt="2020-12-15T12:16:18.206" v="12" actId="732"/>
+        <pc:sldMkLst>
+          <pc:docMk/>
+          <pc:sldMk cId="2828127490" sldId="256"/>
+        </pc:sldMkLst>
+        <pc:picChg chg="add del mod modCrop">
+          <ac:chgData name="Maria Inês Castelo" userId="2a22a08b33d9f8fc" providerId="LiveId" clId="{C0A99F11-A946-4DBD-A5D5-23B2D77DE6CB}" dt="2020-12-15T12:16:18.206" v="12" actId="732"/>
+          <ac:picMkLst>
+            <pc:docMk/>
+            <pc:sldMk cId="2828127490" sldId="256"/>
+            <ac:picMk id="4" creationId="{2D8C552D-450E-4A0D-822A-28ADA372B6BF}"/>
+          </ac:picMkLst>
+        </pc:picChg>
+      </pc:sldChg>
+      <pc:sldChg chg="addSp delSp modSp add">
+        <pc:chgData name="Maria Inês Castelo" userId="2a22a08b33d9f8fc" providerId="LiveId" clId="{C0A99F11-A946-4DBD-A5D5-23B2D77DE6CB}" dt="2020-12-15T12:19:48.625" v="61" actId="1076"/>
+        <pc:sldMkLst>
+          <pc:docMk/>
+          <pc:sldMk cId="2731140413" sldId="257"/>
+        </pc:sldMkLst>
+        <pc:spChg chg="del">
+          <ac:chgData name="Maria Inês Castelo" userId="2a22a08b33d9f8fc" providerId="LiveId" clId="{C0A99F11-A946-4DBD-A5D5-23B2D77DE6CB}" dt="2020-12-15T12:15:37.130" v="6" actId="478"/>
+          <ac:spMkLst>
+            <pc:docMk/>
+            <pc:sldMk cId="2731140413" sldId="257"/>
+            <ac:spMk id="2" creationId="{57CE5C55-C417-4B8B-848A-05C316C3282A}"/>
+          </ac:spMkLst>
+        </pc:spChg>
+        <pc:spChg chg="del">
+          <ac:chgData name="Maria Inês Castelo" userId="2a22a08b33d9f8fc" providerId="LiveId" clId="{C0A99F11-A946-4DBD-A5D5-23B2D77DE6CB}" dt="2020-12-15T12:15:19.672" v="1" actId="931"/>
+          <ac:spMkLst>
+            <pc:docMk/>
+            <pc:sldMk cId="2731140413" sldId="257"/>
+            <ac:spMk id="3" creationId="{27E6B681-CED0-483F-B078-8836DAC7B448}"/>
+          </ac:spMkLst>
+        </pc:spChg>
+        <pc:picChg chg="add mod ord">
+          <ac:chgData name="Maria Inês Castelo" userId="2a22a08b33d9f8fc" providerId="LiveId" clId="{C0A99F11-A946-4DBD-A5D5-23B2D77DE6CB}" dt="2020-12-15T12:19:48.625" v="61" actId="1076"/>
+          <ac:picMkLst>
+            <pc:docMk/>
+            <pc:sldMk cId="2731140413" sldId="257"/>
+            <ac:picMk id="5" creationId="{5C5D5DB1-BF23-4E09-8A53-2C035517C055}"/>
+          </ac:picMkLst>
+        </pc:picChg>
+        <pc:picChg chg="add mod ord modCrop">
+          <ac:chgData name="Maria Inês Castelo" userId="2a22a08b33d9f8fc" providerId="LiveId" clId="{C0A99F11-A946-4DBD-A5D5-23B2D77DE6CB}" dt="2020-12-15T12:19:17.806" v="55" actId="1076"/>
+          <ac:picMkLst>
+            <pc:docMk/>
+            <pc:sldMk cId="2731140413" sldId="257"/>
+            <ac:picMk id="6" creationId="{C8D65739-E51F-48C0-B8E0-5E2E1E8A1885}"/>
+          </ac:picMkLst>
+        </pc:picChg>
+      </pc:sldChg>
+    </pc:docChg>
+  </pc:docChgLst>
+</pc:chgInfo>
 </file>
 
 <file path=ppt/slideLayouts/slideLayout1.xml><?xml version="1.0" encoding="utf-8"?>
@@ -254,7 +336,7 @@
           <a:p>
             <a:fld id="{869ADBEF-B395-4917-843E-3C356B5FB499}" type="datetimeFigureOut">
               <a:rPr lang="pt-PT" smtClean="0"/>
-              <a:t>10/12/2020</a:t>
+              <a:t>15/12/2020</a:t>
             </a:fld>
             <a:endParaRPr lang="pt-PT"/>
           </a:p>
@@ -452,7 +534,7 @@
           <a:p>
             <a:fld id="{869ADBEF-B395-4917-843E-3C356B5FB499}" type="datetimeFigureOut">
               <a:rPr lang="pt-PT" smtClean="0"/>
-              <a:t>10/12/2020</a:t>
+              <a:t>15/12/2020</a:t>
             </a:fld>
             <a:endParaRPr lang="pt-PT"/>
           </a:p>
@@ -660,7 +742,7 @@
           <a:p>
             <a:fld id="{869ADBEF-B395-4917-843E-3C356B5FB499}" type="datetimeFigureOut">
               <a:rPr lang="pt-PT" smtClean="0"/>
-              <a:t>10/12/2020</a:t>
+              <a:t>15/12/2020</a:t>
             </a:fld>
             <a:endParaRPr lang="pt-PT"/>
           </a:p>
@@ -858,7 +940,7 @@
           <a:p>
             <a:fld id="{869ADBEF-B395-4917-843E-3C356B5FB499}" type="datetimeFigureOut">
               <a:rPr lang="pt-PT" smtClean="0"/>
-              <a:t>10/12/2020</a:t>
+              <a:t>15/12/2020</a:t>
             </a:fld>
             <a:endParaRPr lang="pt-PT"/>
           </a:p>
@@ -1133,7 +1215,7 @@
           <a:p>
             <a:fld id="{869ADBEF-B395-4917-843E-3C356B5FB499}" type="datetimeFigureOut">
               <a:rPr lang="pt-PT" smtClean="0"/>
-              <a:t>10/12/2020</a:t>
+              <a:t>15/12/2020</a:t>
             </a:fld>
             <a:endParaRPr lang="pt-PT"/>
           </a:p>
@@ -1398,7 +1480,7 @@
           <a:p>
             <a:fld id="{869ADBEF-B395-4917-843E-3C356B5FB499}" type="datetimeFigureOut">
               <a:rPr lang="pt-PT" smtClean="0"/>
-              <a:t>10/12/2020</a:t>
+              <a:t>15/12/2020</a:t>
             </a:fld>
             <a:endParaRPr lang="pt-PT"/>
           </a:p>
@@ -1810,7 +1892,7 @@
           <a:p>
             <a:fld id="{869ADBEF-B395-4917-843E-3C356B5FB499}" type="datetimeFigureOut">
               <a:rPr lang="pt-PT" smtClean="0"/>
-              <a:t>10/12/2020</a:t>
+              <a:t>15/12/2020</a:t>
             </a:fld>
             <a:endParaRPr lang="pt-PT"/>
           </a:p>
@@ -1951,7 +2033,7 @@
           <a:p>
             <a:fld id="{869ADBEF-B395-4917-843E-3C356B5FB499}" type="datetimeFigureOut">
               <a:rPr lang="pt-PT" smtClean="0"/>
-              <a:t>10/12/2020</a:t>
+              <a:t>15/12/2020</a:t>
             </a:fld>
             <a:endParaRPr lang="pt-PT"/>
           </a:p>
@@ -2064,7 +2146,7 @@
           <a:p>
             <a:fld id="{869ADBEF-B395-4917-843E-3C356B5FB499}" type="datetimeFigureOut">
               <a:rPr lang="pt-PT" smtClean="0"/>
-              <a:t>10/12/2020</a:t>
+              <a:t>15/12/2020</a:t>
             </a:fld>
             <a:endParaRPr lang="pt-PT"/>
           </a:p>
@@ -2375,7 +2457,7 @@
           <a:p>
             <a:fld id="{869ADBEF-B395-4917-843E-3C356B5FB499}" type="datetimeFigureOut">
               <a:rPr lang="pt-PT" smtClean="0"/>
-              <a:t>10/12/2020</a:t>
+              <a:t>15/12/2020</a:t>
             </a:fld>
             <a:endParaRPr lang="pt-PT"/>
           </a:p>
@@ -2663,7 +2745,7 @@
           <a:p>
             <a:fld id="{869ADBEF-B395-4917-843E-3C356B5FB499}" type="datetimeFigureOut">
               <a:rPr lang="pt-PT" smtClean="0"/>
-              <a:t>10/12/2020</a:t>
+              <a:t>15/12/2020</a:t>
             </a:fld>
             <a:endParaRPr lang="pt-PT"/>
           </a:p>
@@ -2904,7 +2986,7 @@
           <a:p>
             <a:fld id="{869ADBEF-B395-4917-843E-3C356B5FB499}" type="datetimeFigureOut">
               <a:rPr lang="pt-PT" smtClean="0"/>
-              <a:t>10/12/2020</a:t>
+              <a:t>15/12/2020</a:t>
             </a:fld>
             <a:endParaRPr lang="pt-PT"/>
           </a:p>
@@ -3335,16 +3417,15 @@
           </p:cNvPicPr>
           <p:nvPr/>
         </p:nvPicPr>
-        <p:blipFill>
+        <p:blipFill rotWithShape="1">
           <a:blip r:embed="rId2"/>
-          <a:stretch>
-            <a:fillRect/>
-          </a:stretch>
+          <a:srcRect l="34692" r="-1" b="47925"/>
+          <a:stretch/>
         </p:blipFill>
         <p:spPr>
           <a:xfrm>
-            <a:off x="1449974" y="327887"/>
-            <a:ext cx="9292051" cy="5955052"/>
+            <a:off x="4673599" y="327887"/>
+            <a:ext cx="6068425" cy="3101113"/>
           </a:xfrm>
           <a:prstGeom prst="rect">
             <a:avLst/>
@@ -3355,6 +3436,128 @@
     <p:extLst>
       <p:ext uri="{BB962C8B-B14F-4D97-AF65-F5344CB8AC3E}">
         <p14:creationId xmlns:p14="http://schemas.microsoft.com/office/powerpoint/2010/main" val="2828127490"/>
+      </p:ext>
+    </p:extLst>
+  </p:cSld>
+  <p:clrMapOvr>
+    <a:masterClrMapping/>
+  </p:clrMapOvr>
+</p:sld>
+</file>
+
+<file path=ppt/slides/slide2.xml><?xml version="1.0" encoding="utf-8"?>
+<p:sld xmlns:a="http://schemas.openxmlformats.org/drawingml/2006/main" xmlns:r="http://schemas.openxmlformats.org/officeDocument/2006/relationships" xmlns:p="http://schemas.openxmlformats.org/presentationml/2006/main">
+  <p:cSld>
+    <p:spTree>
+      <p:nvGrpSpPr>
+        <p:cNvPr id="1" name=""/>
+        <p:cNvGrpSpPr/>
+        <p:nvPr/>
+      </p:nvGrpSpPr>
+      <p:grpSpPr>
+        <a:xfrm>
+          <a:off x="0" y="0"/>
+          <a:ext cx="0" cy="0"/>
+          <a:chOff x="0" y="0"/>
+          <a:chExt cx="0" cy="0"/>
+        </a:xfrm>
+      </p:grpSpPr>
+      <p:pic>
+        <p:nvPicPr>
+          <p:cNvPr id="6" name="Imagem 5">
+            <a:extLst>
+              <a:ext uri="{FF2B5EF4-FFF2-40B4-BE49-F238E27FC236}">
+                <a16:creationId xmlns:a16="http://schemas.microsoft.com/office/drawing/2014/main" id="{C8D65739-E51F-48C0-B8E0-5E2E1E8A1885}"/>
+              </a:ext>
+            </a:extLst>
+          </p:cNvPr>
+          <p:cNvPicPr>
+            <a:picLocks noChangeAspect="1"/>
+          </p:cNvPicPr>
+          <p:nvPr/>
+        </p:nvPicPr>
+        <p:blipFill rotWithShape="1">
+          <a:blip r:embed="rId2"/>
+          <a:srcRect l="472" t="24322" b="841"/>
+          <a:stretch/>
+        </p:blipFill>
+        <p:spPr>
+          <a:xfrm>
+            <a:off x="3995889" y="1228266"/>
+            <a:ext cx="6037478" cy="2322287"/>
+          </a:xfrm>
+          <a:prstGeom prst="rect">
+            <a:avLst/>
+          </a:prstGeom>
+        </p:spPr>
+      </p:pic>
+      <p:pic>
+        <p:nvPicPr>
+          <p:cNvPr id="5" name="Marcador de Posição de Conteúdo 4">
+            <a:extLst>
+              <a:ext uri="{FF2B5EF4-FFF2-40B4-BE49-F238E27FC236}">
+                <a16:creationId xmlns:a16="http://schemas.microsoft.com/office/drawing/2014/main" id="{5C5D5DB1-BF23-4E09-8A53-2C035517C055}"/>
+              </a:ext>
+            </a:extLst>
+          </p:cNvPr>
+          <p:cNvPicPr>
+            <a:picLocks noGrp="1" noChangeAspect="1"/>
+          </p:cNvPicPr>
+          <p:nvPr>
+            <p:ph idx="1"/>
+          </p:nvPr>
+        </p:nvPicPr>
+        <p:blipFill>
+          <a:blip r:embed="rId3">
+            <a:extLst>
+              <a:ext uri="{BEBA8EAE-BF5A-486C-A8C5-ECC9F3942E4B}">
+                <a14:imgProps xmlns:a14="http://schemas.microsoft.com/office/drawing/2010/main">
+                  <a14:imgLayer r:embed="rId4">
+                    <a14:imgEffect>
+                      <a14:backgroundRemoval t="2094" b="98305" l="5674" r="89894">
+                        <a14:foregroundMark x1="78546" y1="5683" x2="78546" y2="5683"/>
+                        <a14:foregroundMark x1="87234" y1="7876" x2="87234" y2="7876"/>
+                        <a14:foregroundMark x1="58688" y1="5184" x2="58688" y2="5184"/>
+                        <a14:foregroundMark x1="84574" y1="2094" x2="84574" y2="2094"/>
+                        <a14:foregroundMark x1="48404" y1="46261" x2="48404" y2="46261"/>
+                        <a14:foregroundMark x1="68440" y1="23430" x2="68440" y2="23430"/>
+                        <a14:foregroundMark x1="59752" y1="24327" x2="59752" y2="24327"/>
+                        <a14:foregroundMark x1="55142" y1="45563" x2="55142" y2="45563"/>
+                        <a14:foregroundMark x1="12411" y1="25125" x2="13121" y2="26221"/>
+                        <a14:foregroundMark x1="11525" y1="34297" x2="11525" y2="34297"/>
+                        <a14:foregroundMark x1="17908" y1="34297" x2="17908" y2="34297"/>
+                        <a14:foregroundMark x1="6028" y1="61715" x2="6028" y2="61715"/>
+                        <a14:foregroundMark x1="14184" y1="72283" x2="14184" y2="72283"/>
+                        <a14:foregroundMark x1="42553" y1="84247" x2="42553" y2="84247"/>
+                        <a14:foregroundMark x1="47163" y1="92124" x2="47163" y2="92124"/>
+                        <a14:foregroundMark x1="43794" y1="98305" x2="43794" y2="98305"/>
+                        <a14:foregroundMark x1="22518" y1="97009" x2="22518" y2="97009"/>
+                        <a14:foregroundMark x1="43262" y1="46062" x2="43262" y2="46660"/>
+                      </a14:backgroundRemoval>
+                    </a14:imgEffect>
+                  </a14:imgLayer>
+                </a14:imgProps>
+              </a:ext>
+              <a:ext uri="{28A0092B-C50C-407E-A947-70E740481C1C}">
+                <a14:useLocalDpi xmlns:a14="http://schemas.microsoft.com/office/drawing/2010/main" val="0"/>
+              </a:ext>
+            </a:extLst>
+          </a:blip>
+          <a:stretch>
+            <a:fillRect/>
+          </a:stretch>
+        </p:blipFill>
+        <p:spPr>
+          <a:xfrm rot="16200000">
+            <a:off x="3728569" y="516743"/>
+            <a:ext cx="4033913" cy="7173785"/>
+          </a:xfrm>
+        </p:spPr>
+      </p:pic>
+    </p:spTree>
+    <p:extLst>
+      <p:ext uri="{BB962C8B-B14F-4D97-AF65-F5344CB8AC3E}">
+        <p14:creationId xmlns:p14="http://schemas.microsoft.com/office/powerpoint/2010/main" val="2731140413"/>
       </p:ext>
     </p:extLst>
   </p:cSld>

</xml_diff>